<commit_message>
added course materials for cse 306
</commit_message>
<xml_diff>
--- a/SPRING 20/CSE 101/Course Materials/number_systems_and_ops_2.pptx
+++ b/SPRING 20/CSE 101/Course Materials/number_systems_and_ops_2.pptx
@@ -314,7 +314,7 @@
           <a:p>
             <a:fld id="{F425826C-E0E0-43C3-9944-7BF649A39996}" type="datetimeFigureOut">
               <a:rPr lang="en-SG" smtClean="0"/>
-              <a:t>1/3/2020</a:t>
+              <a:t>2/3/2020</a:t>
             </a:fld>
             <a:endParaRPr lang="en-SG"/>
           </a:p>
@@ -652,7 +652,7 @@
           <a:p>
             <a:fld id="{F425826C-E0E0-43C3-9944-7BF649A39996}" type="datetimeFigureOut">
               <a:rPr lang="en-SG" smtClean="0"/>
-              <a:t>1/3/2020</a:t>
+              <a:t>2/3/2020</a:t>
             </a:fld>
             <a:endParaRPr lang="en-SG"/>
           </a:p>
@@ -1053,7 +1053,7 @@
           <a:p>
             <a:fld id="{F425826C-E0E0-43C3-9944-7BF649A39996}" type="datetimeFigureOut">
               <a:rPr lang="en-SG" smtClean="0"/>
-              <a:t>1/3/2020</a:t>
+              <a:t>2/3/2020</a:t>
             </a:fld>
             <a:endParaRPr lang="en-SG"/>
           </a:p>
@@ -1389,7 +1389,7 @@
           <a:p>
             <a:fld id="{F425826C-E0E0-43C3-9944-7BF649A39996}" type="datetimeFigureOut">
               <a:rPr lang="en-SG" smtClean="0"/>
-              <a:t>1/3/2020</a:t>
+              <a:t>2/3/2020</a:t>
             </a:fld>
             <a:endParaRPr lang="en-SG"/>
           </a:p>
@@ -1709,7 +1709,7 @@
           <a:p>
             <a:fld id="{F425826C-E0E0-43C3-9944-7BF649A39996}" type="datetimeFigureOut">
               <a:rPr lang="en-SG" smtClean="0"/>
-              <a:t>1/3/2020</a:t>
+              <a:t>2/3/2020</a:t>
             </a:fld>
             <a:endParaRPr lang="en-SG"/>
           </a:p>
@@ -2105,7 +2105,7 @@
           <a:p>
             <a:fld id="{F425826C-E0E0-43C3-9944-7BF649A39996}" type="datetimeFigureOut">
               <a:rPr lang="en-SG" smtClean="0"/>
-              <a:t>1/3/2020</a:t>
+              <a:t>2/3/2020</a:t>
             </a:fld>
             <a:endParaRPr lang="en-SG"/>
           </a:p>
@@ -2362,7 +2362,7 @@
           <a:p>
             <a:fld id="{F425826C-E0E0-43C3-9944-7BF649A39996}" type="datetimeFigureOut">
               <a:rPr lang="en-SG" smtClean="0"/>
-              <a:t>1/3/2020</a:t>
+              <a:t>2/3/2020</a:t>
             </a:fld>
             <a:endParaRPr lang="en-SG"/>
           </a:p>
@@ -2624,7 +2624,7 @@
           <a:p>
             <a:fld id="{F425826C-E0E0-43C3-9944-7BF649A39996}" type="datetimeFigureOut">
               <a:rPr lang="en-SG" smtClean="0"/>
-              <a:t>1/3/2020</a:t>
+              <a:t>2/3/2020</a:t>
             </a:fld>
             <a:endParaRPr lang="en-SG"/>
           </a:p>
@@ -2886,7 +2886,7 @@
           <a:p>
             <a:fld id="{F425826C-E0E0-43C3-9944-7BF649A39996}" type="datetimeFigureOut">
               <a:rPr lang="en-SG" smtClean="0"/>
-              <a:t>1/3/2020</a:t>
+              <a:t>2/3/2020</a:t>
             </a:fld>
             <a:endParaRPr lang="en-SG"/>
           </a:p>
@@ -3215,7 +3215,7 @@
           <a:p>
             <a:fld id="{F425826C-E0E0-43C3-9944-7BF649A39996}" type="datetimeFigureOut">
               <a:rPr lang="en-SG" smtClean="0"/>
-              <a:t>1/3/2020</a:t>
+              <a:t>2/3/2020</a:t>
             </a:fld>
             <a:endParaRPr lang="en-SG"/>
           </a:p>
@@ -3538,7 +3538,7 @@
           <a:p>
             <a:fld id="{F425826C-E0E0-43C3-9944-7BF649A39996}" type="datetimeFigureOut">
               <a:rPr lang="en-SG" smtClean="0"/>
-              <a:t>1/3/2020</a:t>
+              <a:t>2/3/2020</a:t>
             </a:fld>
             <a:endParaRPr lang="en-SG"/>
           </a:p>
@@ -3995,7 +3995,7 @@
           <a:p>
             <a:fld id="{F425826C-E0E0-43C3-9944-7BF649A39996}" type="datetimeFigureOut">
               <a:rPr lang="en-SG" smtClean="0"/>
-              <a:t>1/3/2020</a:t>
+              <a:t>2/3/2020</a:t>
             </a:fld>
             <a:endParaRPr lang="en-SG"/>
           </a:p>
@@ -4200,7 +4200,7 @@
           <a:p>
             <a:fld id="{F425826C-E0E0-43C3-9944-7BF649A39996}" type="datetimeFigureOut">
               <a:rPr lang="en-SG" smtClean="0"/>
-              <a:t>1/3/2020</a:t>
+              <a:t>2/3/2020</a:t>
             </a:fld>
             <a:endParaRPr lang="en-SG"/>
           </a:p>
@@ -4377,7 +4377,7 @@
           <a:p>
             <a:fld id="{F425826C-E0E0-43C3-9944-7BF649A39996}" type="datetimeFigureOut">
               <a:rPr lang="en-SG" smtClean="0"/>
-              <a:t>1/3/2020</a:t>
+              <a:t>2/3/2020</a:t>
             </a:fld>
             <a:endParaRPr lang="en-SG"/>
           </a:p>
@@ -4710,7 +4710,7 @@
           <a:p>
             <a:fld id="{F425826C-E0E0-43C3-9944-7BF649A39996}" type="datetimeFigureOut">
               <a:rPr lang="en-SG" smtClean="0"/>
-              <a:t>1/3/2020</a:t>
+              <a:t>2/3/2020</a:t>
             </a:fld>
             <a:endParaRPr lang="en-SG"/>
           </a:p>
@@ -5055,7 +5055,7 @@
           <a:p>
             <a:fld id="{F425826C-E0E0-43C3-9944-7BF649A39996}" type="datetimeFigureOut">
               <a:rPr lang="en-SG" smtClean="0"/>
-              <a:t>1/3/2020</a:t>
+              <a:t>2/3/2020</a:t>
             </a:fld>
             <a:endParaRPr lang="en-SG"/>
           </a:p>
@@ -7172,7 +7172,7 @@
           <a:p>
             <a:fld id="{F425826C-E0E0-43C3-9944-7BF649A39996}" type="datetimeFigureOut">
               <a:rPr lang="en-SG" smtClean="0"/>
-              <a:t>1/3/2020</a:t>
+              <a:t>2/3/2020</a:t>
             </a:fld>
             <a:endParaRPr lang="en-SG"/>
           </a:p>
@@ -7929,8 +7929,8 @@
           </a:p>
         </p:txBody>
       </p:sp>
-      <mc:AlternateContent xmlns:mc="http://schemas.openxmlformats.org/markup-compatibility/2006">
-        <mc:Choice xmlns:a14="http://schemas.microsoft.com/office/drawing/2010/main" Requires="a14">
+      <mc:AlternateContent xmlns:mc="http://schemas.openxmlformats.org/markup-compatibility/2006" xmlns:a14="http://schemas.microsoft.com/office/drawing/2010/main">
+        <mc:Choice Requires="a14">
           <p:sp>
             <p:nvSpPr>
               <p:cNvPr id="3" name="Content Placeholder 2">
@@ -8009,21 +8009,7 @@
                         <a:latin typeface="Cambria Math" panose="02040503050406030204" pitchFamily="18" charset="0"/>
                         <a:ea typeface="Cambria Math" panose="02040503050406030204" pitchFamily="18" charset="0"/>
                       </a:rPr>
-                      <m:t>×</m:t>
-                    </m:r>
-                    <m:r>
-                      <a:rPr lang="en-SG" i="1">
-                        <a:latin typeface="Cambria Math" panose="02040503050406030204" pitchFamily="18" charset="0"/>
-                        <a:ea typeface="Cambria Math" panose="02040503050406030204" pitchFamily="18" charset="0"/>
-                      </a:rPr>
-                      <m:t>1</m:t>
-                    </m:r>
-                    <m:r>
-                      <a:rPr lang="en-SG" i="1">
-                        <a:latin typeface="Cambria Math" panose="02040503050406030204" pitchFamily="18" charset="0"/>
-                        <a:ea typeface="Cambria Math" panose="02040503050406030204" pitchFamily="18" charset="0"/>
-                      </a:rPr>
-                      <m:t>=</m:t>
+                      <m:t>×1=</m:t>
                     </m:r>
                     <m:r>
                       <a:rPr lang="en-SG" i="1">
@@ -8091,21 +8077,7 @@
                         <a:latin typeface="Cambria Math" panose="02040503050406030204" pitchFamily="18" charset="0"/>
                         <a:ea typeface="Cambria Math" panose="02040503050406030204" pitchFamily="18" charset="0"/>
                       </a:rPr>
-                      <m:t>×</m:t>
-                    </m:r>
-                    <m:r>
-                      <a:rPr lang="en-SG" i="1">
-                        <a:latin typeface="Cambria Math" panose="02040503050406030204" pitchFamily="18" charset="0"/>
-                        <a:ea typeface="Cambria Math" panose="02040503050406030204" pitchFamily="18" charset="0"/>
-                      </a:rPr>
-                      <m:t>1</m:t>
-                    </m:r>
-                    <m:r>
-                      <a:rPr lang="en-SG" i="1">
-                        <a:latin typeface="Cambria Math" panose="02040503050406030204" pitchFamily="18" charset="0"/>
-                        <a:ea typeface="Cambria Math" panose="02040503050406030204" pitchFamily="18" charset="0"/>
-                      </a:rPr>
-                      <m:t>=</m:t>
+                      <m:t>×1=</m:t>
                     </m:r>
                     <m:r>
                       <a:rPr lang="en-SG" i="1">
@@ -8191,7 +8163,7 @@
             </p:txBody>
           </p:sp>
         </mc:Choice>
-        <mc:Fallback>
+        <mc:Fallback xmlns="">
           <p:sp>
             <p:nvSpPr>
               <p:cNvPr id="3" name="Content Placeholder 2">
@@ -8289,8 +8261,8 @@
           </a:p>
         </p:txBody>
       </p:sp>
-      <mc:AlternateContent xmlns:mc="http://schemas.openxmlformats.org/markup-compatibility/2006">
-        <mc:Choice xmlns:a14="http://schemas.microsoft.com/office/drawing/2010/main" Requires="a14">
+      <mc:AlternateContent xmlns:mc="http://schemas.openxmlformats.org/markup-compatibility/2006" xmlns:a14="http://schemas.microsoft.com/office/drawing/2010/main">
+        <mc:Choice Requires="a14">
           <p:graphicFrame>
             <p:nvGraphicFramePr>
               <p:cNvPr id="4" name="Content Placeholder 3">
@@ -9848,7 +9820,7 @@
             </a:graphic>
           </p:graphicFrame>
         </mc:Choice>
-        <mc:Fallback>
+        <mc:Fallback xmlns="">
           <p:graphicFrame>
             <p:nvGraphicFramePr>
               <p:cNvPr id="4" name="Content Placeholder 3">
@@ -11057,8 +11029,8 @@
           </p:graphicFrame>
         </mc:Fallback>
       </mc:AlternateContent>
-      <mc:AlternateContent xmlns:mc="http://schemas.openxmlformats.org/markup-compatibility/2006">
-        <mc:Choice xmlns:a14="http://schemas.microsoft.com/office/drawing/2010/main" Requires="a14">
+      <mc:AlternateContent xmlns:mc="http://schemas.openxmlformats.org/markup-compatibility/2006" xmlns:a14="http://schemas.microsoft.com/office/drawing/2010/main">
+        <mc:Choice Requires="a14">
           <p:graphicFrame>
             <p:nvGraphicFramePr>
               <p:cNvPr id="5" name="Content Placeholder 3">
@@ -13712,7 +13684,7 @@
             </a:graphic>
           </p:graphicFrame>
         </mc:Choice>
-        <mc:Fallback>
+        <mc:Fallback xmlns="">
           <p:graphicFrame>
             <p:nvGraphicFramePr>
               <p:cNvPr id="5" name="Content Placeholder 3">
@@ -19503,13 +19475,13 @@
                 <a14:m>
                   <m:oMath xmlns:m="http://schemas.openxmlformats.org/officeDocument/2006/math">
                     <m:r>
-                      <a:rPr lang="en-SG" i="1" dirty="0" smtClean="0">
+                      <a:rPr lang="en-SG" b="0" i="1" dirty="0" smtClean="0">
                         <a:solidFill>
                           <a:srgbClr val="FF6600"/>
                         </a:solidFill>
                         <a:latin typeface="Cambria Math" panose="02040503050406030204" pitchFamily="18" charset="0"/>
                       </a:rPr>
-                      <m:t>1</m:t>
+                      <m:t>0</m:t>
                     </m:r>
                   </m:oMath>
                 </a14:m>
@@ -19520,13 +19492,13 @@
                 <a14:m>
                   <m:oMath xmlns:m="http://schemas.openxmlformats.org/officeDocument/2006/math">
                     <m:r>
-                      <a:rPr lang="en-SG" i="1" dirty="0" smtClean="0">
+                      <a:rPr lang="en-SG" b="0" i="1" dirty="0" smtClean="0">
                         <a:solidFill>
                           <a:srgbClr val="00B050"/>
                         </a:solidFill>
                         <a:latin typeface="Cambria Math" panose="02040503050406030204" pitchFamily="18" charset="0"/>
                       </a:rPr>
-                      <m:t>0</m:t>
+                      <m:t>1</m:t>
                     </m:r>
                   </m:oMath>
                 </a14:m>
@@ -23640,8 +23612,8 @@
           </a:p>
         </p:txBody>
       </p:sp>
-      <mc:AlternateContent xmlns:mc="http://schemas.openxmlformats.org/markup-compatibility/2006">
-        <mc:Choice xmlns:a14="http://schemas.microsoft.com/office/drawing/2010/main" Requires="a14">
+      <mc:AlternateContent xmlns:mc="http://schemas.openxmlformats.org/markup-compatibility/2006" xmlns:a14="http://schemas.microsoft.com/office/drawing/2010/main">
+        <mc:Choice Requires="a14">
           <p:sp>
             <p:nvSpPr>
               <p:cNvPr id="3" name="Content Placeholder 2">
@@ -23954,7 +23926,7 @@
             </p:txBody>
           </p:sp>
         </mc:Choice>
-        <mc:Fallback>
+        <mc:Fallback xmlns="">
           <p:sp>
             <p:nvSpPr>
               <p:cNvPr id="3" name="Content Placeholder 2">

</xml_diff>